<commit_message>
updated an administrative detail and added the github link to this repository.
</commit_message>
<xml_diff>
--- a/slides/1_Intro_and_Motivation.pptx
+++ b/slides/1_Intro_and_Motivation.pptx
@@ -134,7 +134,7 @@
 <file path=ppt/revisionInfo.xml><?xml version="1.0" encoding="utf-8"?>
 <p1510:revInfo xmlns:a="http://schemas.openxmlformats.org/drawingml/2006/main" xmlns:r="http://schemas.openxmlformats.org/officeDocument/2006/relationships" xmlns:p1510="http://schemas.microsoft.com/office/powerpoint/2015/10/main">
   <p1510:revLst>
-    <p1510:client id="{E5C980FB-271D-4909-A0C2-B1D08BBC8560}" v="7" dt="2021-02-18T10:11:46.500"/>
+    <p1510:client id="{E5C980FB-271D-4909-A0C2-B1D08BBC8560}" v="39" dt="2021-02-18T18:22:03.507"/>
   </p1510:revLst>
 </p1510:revInfo>
 </file>
@@ -909,7 +909,7 @@
   <pc:docChgLst>
     <pc:chgData name="Daniel Schwarz" userId="5bb35bb8-905a-4742-88d9-33d9089732e7" providerId="ADAL" clId="{E5C980FB-271D-4909-A0C2-B1D08BBC8560}"/>
     <pc:docChg chg="modSld">
-      <pc:chgData name="Daniel Schwarz" userId="5bb35bb8-905a-4742-88d9-33d9089732e7" providerId="ADAL" clId="{E5C980FB-271D-4909-A0C2-B1D08BBC8560}" dt="2021-02-18T10:11:46.500" v="6" actId="20577"/>
+      <pc:chgData name="Daniel Schwarz" userId="5bb35bb8-905a-4742-88d9-33d9089732e7" providerId="ADAL" clId="{E5C980FB-271D-4909-A0C2-B1D08BBC8560}" dt="2021-02-18T18:22:03.507" v="43"/>
       <pc:docMkLst>
         <pc:docMk/>
       </pc:docMkLst>
@@ -928,14 +928,14 @@
           </ac:spMkLst>
         </pc:spChg>
       </pc:sldChg>
-      <pc:sldChg chg="modSp">
-        <pc:chgData name="Daniel Schwarz" userId="5bb35bb8-905a-4742-88d9-33d9089732e7" providerId="ADAL" clId="{E5C980FB-271D-4909-A0C2-B1D08BBC8560}" dt="2021-02-18T10:11:46.500" v="6" actId="20577"/>
+      <pc:sldChg chg="modSp mod modAnim">
+        <pc:chgData name="Daniel Schwarz" userId="5bb35bb8-905a-4742-88d9-33d9089732e7" providerId="ADAL" clId="{E5C980FB-271D-4909-A0C2-B1D08BBC8560}" dt="2021-02-18T18:22:03.507" v="43"/>
         <pc:sldMkLst>
           <pc:docMk/>
           <pc:sldMk cId="287741505" sldId="306"/>
         </pc:sldMkLst>
         <pc:spChg chg="mod">
-          <ac:chgData name="Daniel Schwarz" userId="5bb35bb8-905a-4742-88d9-33d9089732e7" providerId="ADAL" clId="{E5C980FB-271D-4909-A0C2-B1D08BBC8560}" dt="2021-02-18T10:11:46.500" v="6" actId="20577"/>
+          <ac:chgData name="Daniel Schwarz" userId="5bb35bb8-905a-4742-88d9-33d9089732e7" providerId="ADAL" clId="{E5C980FB-271D-4909-A0C2-B1D08BBC8560}" dt="2021-02-18T18:20:54.364" v="39"/>
           <ac:spMkLst>
             <pc:docMk/>
             <pc:sldMk cId="287741505" sldId="306"/>
@@ -18447,8 +18447,8 @@
         </p:nvSpPr>
         <p:spPr>
           <a:xfrm>
-            <a:off x="838200" y="1576551"/>
-            <a:ext cx="10515600" cy="5118539"/>
+            <a:off x="838200" y="1460640"/>
+            <a:ext cx="10515600" cy="5287890"/>
           </a:xfrm>
         </p:spPr>
         <p:txBody>
@@ -18494,11 +18494,11 @@
             </a:r>
             <a:r>
               <a:rPr lang="de-DE" dirty="0"/>
-              <a:t> </a:t>
+              <a:t> in </a:t>
             </a:r>
             <a:r>
               <a:rPr lang="de-DE" dirty="0" err="1"/>
-              <a:t>later</a:t>
+              <a:t>the</a:t>
             </a:r>
             <a:r>
               <a:rPr lang="de-DE" dirty="0"/>
@@ -18506,7 +18506,15 @@
             </a:r>
             <a:r>
               <a:rPr lang="de-DE" dirty="0" err="1"/>
-              <a:t>today</a:t>
+              <a:t>first</a:t>
+            </a:r>
+            <a:r>
+              <a:rPr lang="de-DE" dirty="0"/>
+              <a:t> lab </a:t>
+            </a:r>
+            <a:r>
+              <a:rPr lang="de-DE" dirty="0" err="1"/>
+              <a:t>session</a:t>
             </a:r>
             <a:endParaRPr lang="de-DE" dirty="0"/>
           </a:p>
@@ -18762,6 +18770,13 @@
             <a:r>
               <a:rPr lang="de-AT" dirty="0"/>
               <a:t>https://creativecommons.org/licenses/by-sa/4.0/</a:t>
+            </a:r>
+          </a:p>
+          <a:p>
+            <a:pPr lvl="1"/>
+            <a:r>
+              <a:rPr lang="de-AT" dirty="0"/>
+              <a:t>https://github.com/dschwarz91/websec-lecture</a:t>
             </a:r>
           </a:p>
         </p:txBody>
@@ -19258,15 +19273,33 @@
                                   </p:childTnLst>
                                 </p:cTn>
                               </p:par>
+                            </p:childTnLst>
+                          </p:cTn>
+                        </p:par>
+                      </p:childTnLst>
+                    </p:cTn>
+                  </p:par>
+                  <p:par>
+                    <p:cTn id="39" fill="hold">
+                      <p:stCondLst>
+                        <p:cond delay="indefinite"/>
+                      </p:stCondLst>
+                      <p:childTnLst>
+                        <p:par>
+                          <p:cTn id="40" fill="hold">
+                            <p:stCondLst>
+                              <p:cond delay="0"/>
+                            </p:stCondLst>
+                            <p:childTnLst>
                               <p:par>
-                                <p:cTn id="39" presetID="1" presetClass="entr" presetSubtype="0" fill="hold" grpId="0" nodeType="withEffect">
+                                <p:cTn id="41" presetID="1" presetClass="entr" presetSubtype="0" fill="hold" grpId="0" nodeType="clickEffect">
                                   <p:stCondLst>
                                     <p:cond delay="0"/>
                                   </p:stCondLst>
                                   <p:childTnLst>
                                     <p:set>
                                       <p:cBhvr>
-                                        <p:cTn id="40" dur="1" fill="hold">
+                                        <p:cTn id="42" dur="1" fill="hold">
                                           <p:stCondLst>
                                             <p:cond delay="0"/>
                                           </p:stCondLst>
@@ -19290,14 +19323,14 @@
                                 </p:cTn>
                               </p:par>
                               <p:par>
-                                <p:cTn id="41" presetID="1" presetClass="entr" presetSubtype="0" fill="hold" grpId="0" nodeType="withEffect">
+                                <p:cTn id="43" presetID="1" presetClass="entr" presetSubtype="0" fill="hold" grpId="0" nodeType="withEffect">
                                   <p:stCondLst>
                                     <p:cond delay="0"/>
                                   </p:stCondLst>
                                   <p:childTnLst>
                                     <p:set>
                                       <p:cBhvr>
-                                        <p:cTn id="42" dur="1" fill="hold">
+                                        <p:cTn id="44" dur="1" fill="hold">
                                           <p:stCondLst>
                                             <p:cond delay="0"/>
                                           </p:stCondLst>
@@ -19306,6 +19339,37 @@
                                           <p:spTgt spid="3">
                                             <p:txEl>
                                               <p:pRg st="18" end="18"/>
+                                            </p:txEl>
+                                          </p:spTgt>
+                                        </p:tgtEl>
+                                        <p:attrNameLst>
+                                          <p:attrName>style.visibility</p:attrName>
+                                        </p:attrNameLst>
+                                      </p:cBhvr>
+                                      <p:to>
+                                        <p:strVal val="visible"/>
+                                      </p:to>
+                                    </p:set>
+                                  </p:childTnLst>
+                                </p:cTn>
+                              </p:par>
+                              <p:par>
+                                <p:cTn id="45" presetID="1" presetClass="entr" presetSubtype="0" fill="hold" grpId="0" nodeType="withEffect">
+                                  <p:stCondLst>
+                                    <p:cond delay="0"/>
+                                  </p:stCondLst>
+                                  <p:childTnLst>
+                                    <p:set>
+                                      <p:cBhvr>
+                                        <p:cTn id="46" dur="1" fill="hold">
+                                          <p:stCondLst>
+                                            <p:cond delay="0"/>
+                                          </p:stCondLst>
+                                        </p:cTn>
+                                        <p:tgtEl>
+                                          <p:spTgt spid="3">
+                                            <p:txEl>
+                                              <p:pRg st="19" end="19"/>
                                             </p:txEl>
                                           </p:spTgt>
                                         </p:tgtEl>
@@ -19348,7 +19412,7 @@
       </p:par>
     </p:tnLst>
     <p:bldLst>
-      <p:bldP spid="3" grpId="0" build="p"/>
+      <p:bldP spid="3" grpId="0" uiExpand="1" build="p"/>
     </p:bldLst>
   </p:timing>
 </p:sld>

</xml_diff>

<commit_message>
Updated Verizon Investigation Report charts to 2021 version.
</commit_message>
<xml_diff>
--- a/slides/1_Intro_and_Motivation.pptx
+++ b/slides/1_Intro_and_Motivation.pptx
@@ -134,13 +134,77 @@
 <file path=ppt/revisionInfo.xml><?xml version="1.0" encoding="utf-8"?>
 <p1510:revInfo xmlns:a="http://schemas.openxmlformats.org/drawingml/2006/main" xmlns:r="http://schemas.openxmlformats.org/officeDocument/2006/relationships" xmlns:p1510="http://schemas.microsoft.com/office/powerpoint/2015/10/main">
   <p1510:revLst>
-    <p1510:client id="{E5C980FB-271D-4909-A0C2-B1D08BBC8560}" v="39" dt="2021-02-18T18:22:03.507"/>
+    <p1510:client id="{B57C1C39-A402-42CC-BD80-18349EE1F998}" v="5" dt="2022-03-18T20:49:05.931"/>
   </p1510:revLst>
 </p1510:revInfo>
 </file>
 
 <file path=ppt/changesInfos/changesInfo1.xml><?xml version="1.0" encoding="utf-8"?>
 <pc:chgInfo xmlns:a="http://schemas.openxmlformats.org/drawingml/2006/main" xmlns:r="http://schemas.openxmlformats.org/officeDocument/2006/relationships" xmlns:ac="http://schemas.microsoft.com/office/drawing/2013/main/command" xmlns:pc="http://schemas.microsoft.com/office/powerpoint/2013/main/command">
+  <pc:docChgLst>
+    <pc:chgData name="Daniel Schwarz" userId="5bb35bb8-905a-4742-88d9-33d9089732e7" providerId="ADAL" clId="{B57C1C39-A402-42CC-BD80-18349EE1F998}"/>
+    <pc:docChg chg="custSel modSld">
+      <pc:chgData name="Daniel Schwarz" userId="5bb35bb8-905a-4742-88d9-33d9089732e7" providerId="ADAL" clId="{B57C1C39-A402-42CC-BD80-18349EE1F998}" dt="2022-03-18T20:49:05.931" v="17"/>
+      <pc:docMkLst>
+        <pc:docMk/>
+      </pc:docMkLst>
+      <pc:sldChg chg="addSp delSp modSp mod modAnim">
+        <pc:chgData name="Daniel Schwarz" userId="5bb35bb8-905a-4742-88d9-33d9089732e7" providerId="ADAL" clId="{B57C1C39-A402-42CC-BD80-18349EE1F998}" dt="2022-03-18T20:49:05.931" v="17"/>
+        <pc:sldMkLst>
+          <pc:docMk/>
+          <pc:sldMk cId="4238467972" sldId="295"/>
+        </pc:sldMkLst>
+        <pc:spChg chg="mod">
+          <ac:chgData name="Daniel Schwarz" userId="5bb35bb8-905a-4742-88d9-33d9089732e7" providerId="ADAL" clId="{B57C1C39-A402-42CC-BD80-18349EE1F998}" dt="2022-03-18T20:45:07.754" v="1" actId="20577"/>
+          <ac:spMkLst>
+            <pc:docMk/>
+            <pc:sldMk cId="4238467972" sldId="295"/>
+            <ac:spMk id="3" creationId="{0FDBC933-DDE8-4D53-90BD-BE23D32B2A4F}"/>
+          </ac:spMkLst>
+        </pc:spChg>
+        <pc:picChg chg="del">
+          <ac:chgData name="Daniel Schwarz" userId="5bb35bb8-905a-4742-88d9-33d9089732e7" providerId="ADAL" clId="{B57C1C39-A402-42CC-BD80-18349EE1F998}" dt="2022-03-18T20:46:30.595" v="2" actId="478"/>
+          <ac:picMkLst>
+            <pc:docMk/>
+            <pc:sldMk cId="4238467972" sldId="295"/>
+            <ac:picMk id="4" creationId="{13E94840-8D6A-43EA-8886-B761F9AF5EAD}"/>
+          </ac:picMkLst>
+        </pc:picChg>
+        <pc:picChg chg="del">
+          <ac:chgData name="Daniel Schwarz" userId="5bb35bb8-905a-4742-88d9-33d9089732e7" providerId="ADAL" clId="{B57C1C39-A402-42CC-BD80-18349EE1F998}" dt="2022-03-18T20:47:55.151" v="11" actId="478"/>
+          <ac:picMkLst>
+            <pc:docMk/>
+            <pc:sldMk cId="4238467972" sldId="295"/>
+            <ac:picMk id="5" creationId="{BA770E49-9BB6-4021-B4B0-8DF22E5E2D28}"/>
+          </ac:picMkLst>
+        </pc:picChg>
+        <pc:picChg chg="add mod">
+          <ac:chgData name="Daniel Schwarz" userId="5bb35bb8-905a-4742-88d9-33d9089732e7" providerId="ADAL" clId="{B57C1C39-A402-42CC-BD80-18349EE1F998}" dt="2022-03-18T20:47:52.106" v="10" actId="1076"/>
+          <ac:picMkLst>
+            <pc:docMk/>
+            <pc:sldMk cId="4238467972" sldId="295"/>
+            <ac:picMk id="6" creationId="{475975E8-5C61-451D-AC6E-C722FFD810FD}"/>
+          </ac:picMkLst>
+        </pc:picChg>
+        <pc:picChg chg="add mod">
+          <ac:chgData name="Daniel Schwarz" userId="5bb35bb8-905a-4742-88d9-33d9089732e7" providerId="ADAL" clId="{B57C1C39-A402-42CC-BD80-18349EE1F998}" dt="2022-03-18T20:48:30.484" v="15" actId="14100"/>
+          <ac:picMkLst>
+            <pc:docMk/>
+            <pc:sldMk cId="4238467972" sldId="295"/>
+            <ac:picMk id="8" creationId="{68512492-A59E-408F-94DD-BF7FE9B3AC05}"/>
+          </ac:picMkLst>
+        </pc:picChg>
+        <pc:picChg chg="add del mod">
+          <ac:chgData name="Daniel Schwarz" userId="5bb35bb8-905a-4742-88d9-33d9089732e7" providerId="ADAL" clId="{B57C1C39-A402-42CC-BD80-18349EE1F998}" dt="2022-03-18T20:47:03.672" v="5" actId="478"/>
+          <ac:picMkLst>
+            <pc:docMk/>
+            <pc:sldMk cId="4238467972" sldId="295"/>
+            <ac:picMk id="1026" creationId="{2E99DA89-F3C1-491B-8EB6-A49D1190275A}"/>
+          </ac:picMkLst>
+        </pc:picChg>
+      </pc:sldChg>
+    </pc:docChg>
+  </pc:docChgLst>
   <pc:docChgLst>
     <pc:chgData name="Daniel Schwarz" userId="5bb35bb8-905a-4742-88d9-33d9089732e7" providerId="ADAL" clId="{C7693917-ED5C-4168-BFA0-78ABC8350BC1}"/>
     <pc:docChg chg="undo custSel addSld delSld modSld sldOrd modMainMaster">
@@ -11676,7 +11740,7 @@
           <a:p>
             <a:fld id="{E9A67217-929B-4143-94A9-94A0B9892952}" type="datetimeFigureOut">
               <a:rPr lang="de-AT" smtClean="0"/>
-              <a:t>18.02.2021</a:t>
+              <a:t>18.03.2022</a:t>
             </a:fld>
             <a:endParaRPr lang="de-AT"/>
           </a:p>
@@ -13354,7 +13418,7 @@
           <a:p>
             <a:fld id="{7F00868D-D319-4986-8E30-C82AA1E82F34}" type="datetime1">
               <a:rPr lang="de-AT" smtClean="0"/>
-              <a:t>18.02.2021</a:t>
+              <a:t>18.03.2022</a:t>
             </a:fld>
             <a:endParaRPr lang="de-AT"/>
           </a:p>
@@ -13648,7 +13712,7 @@
           <a:p>
             <a:fld id="{DFC8F35A-701B-4028-8059-58ABBF80CA73}" type="datetime1">
               <a:rPr lang="de-AT" smtClean="0"/>
-              <a:t>18.02.2021</a:t>
+              <a:t>18.03.2022</a:t>
             </a:fld>
             <a:endParaRPr lang="de-AT"/>
           </a:p>
@@ -13848,7 +13912,7 @@
           <a:p>
             <a:fld id="{12BA8DF8-1EF7-4B92-AE3B-451C7066014D}" type="datetime1">
               <a:rPr lang="de-AT" smtClean="0"/>
-              <a:t>18.02.2021</a:t>
+              <a:t>18.03.2022</a:t>
             </a:fld>
             <a:endParaRPr lang="de-AT"/>
           </a:p>
@@ -14058,7 +14122,7 @@
           <a:p>
             <a:fld id="{4A88ADED-F77F-4C3A-9782-F50B8247FB72}" type="datetime1">
               <a:rPr lang="de-AT" smtClean="0"/>
-              <a:t>18.02.2021</a:t>
+              <a:t>18.03.2022</a:t>
             </a:fld>
             <a:endParaRPr lang="de-AT"/>
           </a:p>
@@ -14258,7 +14322,7 @@
           <a:p>
             <a:fld id="{0FB0CD05-15AB-4463-8B74-34F02B6F4B78}" type="datetime1">
               <a:rPr lang="de-AT" smtClean="0"/>
-              <a:t>18.02.2021</a:t>
+              <a:t>18.03.2022</a:t>
             </a:fld>
             <a:endParaRPr lang="de-AT"/>
           </a:p>
@@ -14538,7 +14602,7 @@
           <a:p>
             <a:fld id="{19FC0308-FB4F-4FC3-85ED-1D3708B4786A}" type="datetime1">
               <a:rPr lang="de-AT" smtClean="0"/>
-              <a:t>18.02.2021</a:t>
+              <a:t>18.03.2022</a:t>
             </a:fld>
             <a:endParaRPr lang="de-AT"/>
           </a:p>
@@ -14810,7 +14874,7 @@
           <a:p>
             <a:fld id="{5E20FD88-E2E4-466D-AB5C-F4AB14FD2E5A}" type="datetime1">
               <a:rPr lang="de-AT" smtClean="0"/>
-              <a:t>18.02.2021</a:t>
+              <a:t>18.03.2022</a:t>
             </a:fld>
             <a:endParaRPr lang="de-AT"/>
           </a:p>
@@ -15229,7 +15293,7 @@
           <a:p>
             <a:fld id="{5D9DC754-7964-4780-BA5C-2540644978F1}" type="datetime1">
               <a:rPr lang="de-AT" smtClean="0"/>
-              <a:t>18.02.2021</a:t>
+              <a:t>18.03.2022</a:t>
             </a:fld>
             <a:endParaRPr lang="de-AT"/>
           </a:p>
@@ -15375,7 +15439,7 @@
           <a:p>
             <a:fld id="{CCC9F2E3-D8FF-4262-843C-6A02B860818A}" type="datetime1">
               <a:rPr lang="de-AT" smtClean="0"/>
-              <a:t>18.02.2021</a:t>
+              <a:t>18.03.2022</a:t>
             </a:fld>
             <a:endParaRPr lang="de-AT"/>
           </a:p>
@@ -15585,7 +15649,7 @@
           <a:p>
             <a:fld id="{CFE5A437-92C8-44FE-B498-B478F63EB75F}" type="datetime1">
               <a:rPr lang="de-AT" smtClean="0"/>
-              <a:t>18.02.2021</a:t>
+              <a:t>18.03.2022</a:t>
             </a:fld>
             <a:endParaRPr lang="de-AT"/>
           </a:p>
@@ -15902,7 +15966,7 @@
           <a:p>
             <a:fld id="{09367D3E-12BE-41C6-B73B-856BFBBA4990}" type="datetime1">
               <a:rPr lang="de-AT" smtClean="0"/>
-              <a:t>18.02.2021</a:t>
+              <a:t>18.03.2022</a:t>
             </a:fld>
             <a:endParaRPr lang="de-AT"/>
           </a:p>
@@ -16145,7 +16209,7 @@
           <a:p>
             <a:fld id="{A2E2E334-F18E-4AAC-ADA5-E029241BF88C}" type="datetime1">
               <a:rPr lang="de-AT" smtClean="0"/>
-              <a:t>18.02.2021</a:t>
+              <a:t>18.03.2022</a:t>
             </a:fld>
             <a:endParaRPr lang="de-AT" dirty="0"/>
           </a:p>
@@ -16700,7 +16764,7 @@
           <a:p>
             <a:r>
               <a:rPr lang="de-DE" dirty="0"/>
-              <a:t>Source: Verizon 2020 Data </a:t>
+              <a:t>Source: Verizon 2021 Data </a:t>
             </a:r>
             <a:r>
               <a:rPr lang="de-DE" dirty="0" err="1"/>
@@ -16716,10 +16780,10 @@
       </p:sp>
       <p:pic>
         <p:nvPicPr>
-          <p:cNvPr id="4" name="Grafik 3">
+          <p:cNvPr id="6" name="Grafik 5">
             <a:extLst>
               <a:ext uri="{FF2B5EF4-FFF2-40B4-BE49-F238E27FC236}">
-                <a16:creationId xmlns:a16="http://schemas.microsoft.com/office/drawing/2014/main" id="{13E94840-8D6A-43EA-8886-B761F9AF5EAD}"/>
+                <a16:creationId xmlns:a16="http://schemas.microsoft.com/office/drawing/2014/main" id="{475975E8-5C61-451D-AC6E-C722FFD810FD}"/>
               </a:ext>
             </a:extLst>
           </p:cNvPr>
@@ -16736,8 +16800,8 @@
         </p:blipFill>
         <p:spPr>
           <a:xfrm>
-            <a:off x="1700048" y="864476"/>
-            <a:ext cx="4727309" cy="4914901"/>
+            <a:off x="2328755" y="182462"/>
+            <a:ext cx="3232539" cy="6133684"/>
           </a:xfrm>
           <a:prstGeom prst="rect">
             <a:avLst/>
@@ -16746,10 +16810,10 @@
       </p:pic>
       <p:pic>
         <p:nvPicPr>
-          <p:cNvPr id="5" name="Grafik 4">
+          <p:cNvPr id="8" name="Grafik 7">
             <a:extLst>
               <a:ext uri="{FF2B5EF4-FFF2-40B4-BE49-F238E27FC236}">
-                <a16:creationId xmlns:a16="http://schemas.microsoft.com/office/drawing/2014/main" id="{BA770E49-9BB6-4021-B4B0-8DF22E5E2D28}"/>
+                <a16:creationId xmlns:a16="http://schemas.microsoft.com/office/drawing/2014/main" id="{68512492-A59E-408F-94DD-BF7FE9B3AC05}"/>
               </a:ext>
             </a:extLst>
           </p:cNvPr>
@@ -16766,8 +16830,8 @@
         </p:blipFill>
         <p:spPr>
           <a:xfrm>
-            <a:off x="7007164" y="757402"/>
-            <a:ext cx="3232539" cy="5129048"/>
+            <a:off x="6096000" y="182462"/>
+            <a:ext cx="3524518" cy="6123212"/>
           </a:xfrm>
           <a:prstGeom prst="rect">
             <a:avLst/>
@@ -16784,6 +16848,126 @@
   <p:clrMapOvr>
     <a:masterClrMapping/>
   </p:clrMapOvr>
+  <p:timing>
+    <p:tnLst>
+      <p:par>
+        <p:cTn id="1" dur="indefinite" restart="never" nodeType="tmRoot">
+          <p:childTnLst>
+            <p:seq concurrent="1" nextAc="seek">
+              <p:cTn id="2" dur="indefinite" nodeType="mainSeq">
+                <p:childTnLst>
+                  <p:par>
+                    <p:cTn id="3" fill="hold">
+                      <p:stCondLst>
+                        <p:cond delay="indefinite"/>
+                      </p:stCondLst>
+                      <p:childTnLst>
+                        <p:par>
+                          <p:cTn id="4" fill="hold">
+                            <p:stCondLst>
+                              <p:cond delay="0"/>
+                            </p:stCondLst>
+                            <p:childTnLst>
+                              <p:par>
+                                <p:cTn id="5" presetID="1" presetClass="entr" presetSubtype="0" fill="hold" nodeType="clickEffect">
+                                  <p:stCondLst>
+                                    <p:cond delay="0"/>
+                                  </p:stCondLst>
+                                  <p:childTnLst>
+                                    <p:set>
+                                      <p:cBhvr>
+                                        <p:cTn id="6" dur="1" fill="hold">
+                                          <p:stCondLst>
+                                            <p:cond delay="0"/>
+                                          </p:stCondLst>
+                                        </p:cTn>
+                                        <p:tgtEl>
+                                          <p:spTgt spid="6"/>
+                                        </p:tgtEl>
+                                        <p:attrNameLst>
+                                          <p:attrName>style.visibility</p:attrName>
+                                        </p:attrNameLst>
+                                      </p:cBhvr>
+                                      <p:to>
+                                        <p:strVal val="visible"/>
+                                      </p:to>
+                                    </p:set>
+                                  </p:childTnLst>
+                                </p:cTn>
+                              </p:par>
+                            </p:childTnLst>
+                          </p:cTn>
+                        </p:par>
+                      </p:childTnLst>
+                    </p:cTn>
+                  </p:par>
+                  <p:par>
+                    <p:cTn id="7" fill="hold">
+                      <p:stCondLst>
+                        <p:cond delay="indefinite"/>
+                      </p:stCondLst>
+                      <p:childTnLst>
+                        <p:par>
+                          <p:cTn id="8" fill="hold">
+                            <p:stCondLst>
+                              <p:cond delay="0"/>
+                            </p:stCondLst>
+                            <p:childTnLst>
+                              <p:par>
+                                <p:cTn id="9" presetID="1" presetClass="entr" presetSubtype="0" fill="hold" nodeType="clickEffect">
+                                  <p:stCondLst>
+                                    <p:cond delay="0"/>
+                                  </p:stCondLst>
+                                  <p:childTnLst>
+                                    <p:set>
+                                      <p:cBhvr>
+                                        <p:cTn id="10" dur="1" fill="hold">
+                                          <p:stCondLst>
+                                            <p:cond delay="0"/>
+                                          </p:stCondLst>
+                                        </p:cTn>
+                                        <p:tgtEl>
+                                          <p:spTgt spid="8"/>
+                                        </p:tgtEl>
+                                        <p:attrNameLst>
+                                          <p:attrName>style.visibility</p:attrName>
+                                        </p:attrNameLst>
+                                      </p:cBhvr>
+                                      <p:to>
+                                        <p:strVal val="visible"/>
+                                      </p:to>
+                                    </p:set>
+                                  </p:childTnLst>
+                                </p:cTn>
+                              </p:par>
+                            </p:childTnLst>
+                          </p:cTn>
+                        </p:par>
+                      </p:childTnLst>
+                    </p:cTn>
+                  </p:par>
+                </p:childTnLst>
+              </p:cTn>
+              <p:prevCondLst>
+                <p:cond evt="onPrev" delay="0">
+                  <p:tgtEl>
+                    <p:sldTgt/>
+                  </p:tgtEl>
+                </p:cond>
+              </p:prevCondLst>
+              <p:nextCondLst>
+                <p:cond evt="onNext" delay="0">
+                  <p:tgtEl>
+                    <p:sldTgt/>
+                  </p:tgtEl>
+                </p:cond>
+              </p:nextCondLst>
+            </p:seq>
+          </p:childTnLst>
+        </p:cTn>
+      </p:par>
+    </p:tnLst>
+  </p:timing>
 </p:sld>
 </file>
 

</xml_diff>

<commit_message>
Updated the verizon DBIR to 2022
</commit_message>
<xml_diff>
--- a/slides/1_Intro_and_Motivation.pptx
+++ b/slides/1_Intro_and_Motivation.pptx
@@ -17,7 +17,7 @@
     <p:sldId id="299" r:id="rId8"/>
     <p:sldId id="300" r:id="rId9"/>
     <p:sldId id="301" r:id="rId10"/>
-    <p:sldId id="295" r:id="rId11"/>
+    <p:sldId id="309" r:id="rId11"/>
     <p:sldId id="302" r:id="rId12"/>
     <p:sldId id="303" r:id="rId13"/>
     <p:sldId id="304" r:id="rId14"/>
@@ -134,7 +134,7 @@
 <file path=ppt/revisionInfo.xml><?xml version="1.0" encoding="utf-8"?>
 <p1510:revInfo xmlns:a="http://schemas.openxmlformats.org/drawingml/2006/main" xmlns:r="http://schemas.openxmlformats.org/officeDocument/2006/relationships" xmlns:p1510="http://schemas.microsoft.com/office/powerpoint/2015/10/main">
   <p1510:revLst>
-    <p1510:client id="{B57C1C39-A402-42CC-BD80-18349EE1F998}" v="5" dt="2022-03-18T20:49:05.931"/>
+    <p1510:client id="{B57C1C39-A402-42CC-BD80-18349EE1F998}" v="6" dt="2022-10-22T11:53:29.731"/>
   </p1510:revLst>
 </p1510:revInfo>
 </file>
@@ -143,13 +143,20 @@
 <pc:chgInfo xmlns:a="http://schemas.openxmlformats.org/drawingml/2006/main" xmlns:r="http://schemas.openxmlformats.org/officeDocument/2006/relationships" xmlns:ac="http://schemas.microsoft.com/office/drawing/2013/main/command" xmlns:pc="http://schemas.microsoft.com/office/powerpoint/2013/main/command">
   <pc:docChgLst>
     <pc:chgData name="Daniel Schwarz" userId="5bb35bb8-905a-4742-88d9-33d9089732e7" providerId="ADAL" clId="{B57C1C39-A402-42CC-BD80-18349EE1F998}"/>
-    <pc:docChg chg="custSel modSld">
-      <pc:chgData name="Daniel Schwarz" userId="5bb35bb8-905a-4742-88d9-33d9089732e7" providerId="ADAL" clId="{B57C1C39-A402-42CC-BD80-18349EE1F998}" dt="2022-03-18T20:49:05.931" v="17"/>
+    <pc:docChg chg="undo custSel addSld delSld modSld">
+      <pc:chgData name="Daniel Schwarz" userId="5bb35bb8-905a-4742-88d9-33d9089732e7" providerId="ADAL" clId="{B57C1C39-A402-42CC-BD80-18349EE1F998}" dt="2022-10-22T11:53:32.609" v="21" actId="47"/>
       <pc:docMkLst>
         <pc:docMk/>
       </pc:docMkLst>
-      <pc:sldChg chg="addSp delSp modSp mod modAnim">
-        <pc:chgData name="Daniel Schwarz" userId="5bb35bb8-905a-4742-88d9-33d9089732e7" providerId="ADAL" clId="{B57C1C39-A402-42CC-BD80-18349EE1F998}" dt="2022-03-18T20:49:05.931" v="17"/>
+      <pc:sldChg chg="add del">
+        <pc:chgData name="Daniel Schwarz" userId="5bb35bb8-905a-4742-88d9-33d9089732e7" providerId="ADAL" clId="{B57C1C39-A402-42CC-BD80-18349EE1F998}" dt="2022-10-22T11:52:16.797" v="19" actId="47"/>
+        <pc:sldMkLst>
+          <pc:docMk/>
+          <pc:sldMk cId="3875954506" sldId="294"/>
+        </pc:sldMkLst>
+      </pc:sldChg>
+      <pc:sldChg chg="addSp delSp modSp del mod modAnim">
+        <pc:chgData name="Daniel Schwarz" userId="5bb35bb8-905a-4742-88d9-33d9089732e7" providerId="ADAL" clId="{B57C1C39-A402-42CC-BD80-18349EE1F998}" dt="2022-10-22T11:53:32.609" v="21" actId="47"/>
         <pc:sldMkLst>
           <pc:docMk/>
           <pc:sldMk cId="4238467972" sldId="295"/>
@@ -202,6 +209,34 @@
             <ac:picMk id="1026" creationId="{2E99DA89-F3C1-491B-8EB6-A49D1190275A}"/>
           </ac:picMkLst>
         </pc:picChg>
+      </pc:sldChg>
+      <pc:sldChg chg="add del">
+        <pc:chgData name="Daniel Schwarz" userId="5bb35bb8-905a-4742-88d9-33d9089732e7" providerId="ADAL" clId="{B57C1C39-A402-42CC-BD80-18349EE1F998}" dt="2022-10-22T11:52:16.797" v="19" actId="47"/>
+        <pc:sldMkLst>
+          <pc:docMk/>
+          <pc:sldMk cId="1445920273" sldId="297"/>
+        </pc:sldMkLst>
+      </pc:sldChg>
+      <pc:sldChg chg="add del">
+        <pc:chgData name="Daniel Schwarz" userId="5bb35bb8-905a-4742-88d9-33d9089732e7" providerId="ADAL" clId="{B57C1C39-A402-42CC-BD80-18349EE1F998}" dt="2022-10-22T11:52:16.797" v="19" actId="47"/>
+        <pc:sldMkLst>
+          <pc:docMk/>
+          <pc:sldMk cId="1272688928" sldId="298"/>
+        </pc:sldMkLst>
+      </pc:sldChg>
+      <pc:sldChg chg="add del">
+        <pc:chgData name="Daniel Schwarz" userId="5bb35bb8-905a-4742-88d9-33d9089732e7" providerId="ADAL" clId="{B57C1C39-A402-42CC-BD80-18349EE1F998}" dt="2022-10-22T11:52:16.797" v="19" actId="47"/>
+        <pc:sldMkLst>
+          <pc:docMk/>
+          <pc:sldMk cId="180264529" sldId="299"/>
+        </pc:sldMkLst>
+      </pc:sldChg>
+      <pc:sldChg chg="add">
+        <pc:chgData name="Daniel Schwarz" userId="5bb35bb8-905a-4742-88d9-33d9089732e7" providerId="ADAL" clId="{B57C1C39-A402-42CC-BD80-18349EE1F998}" dt="2022-10-22T11:53:29.721" v="20"/>
+        <pc:sldMkLst>
+          <pc:docMk/>
+          <pc:sldMk cId="2654064379" sldId="309"/>
+        </pc:sldMkLst>
       </pc:sldChg>
     </pc:docChg>
   </pc:docChgLst>
@@ -11740,7 +11775,7 @@
           <a:p>
             <a:fld id="{E9A67217-929B-4143-94A9-94A0B9892952}" type="datetimeFigureOut">
               <a:rPr lang="de-AT" smtClean="0"/>
-              <a:t>18.03.2022</a:t>
+              <a:t>22.10.2022</a:t>
             </a:fld>
             <a:endParaRPr lang="de-AT"/>
           </a:p>
@@ -13418,7 +13453,7 @@
           <a:p>
             <a:fld id="{7F00868D-D319-4986-8E30-C82AA1E82F34}" type="datetime1">
               <a:rPr lang="de-AT" smtClean="0"/>
-              <a:t>18.03.2022</a:t>
+              <a:t>22.10.2022</a:t>
             </a:fld>
             <a:endParaRPr lang="de-AT"/>
           </a:p>
@@ -13712,7 +13747,7 @@
           <a:p>
             <a:fld id="{DFC8F35A-701B-4028-8059-58ABBF80CA73}" type="datetime1">
               <a:rPr lang="de-AT" smtClean="0"/>
-              <a:t>18.03.2022</a:t>
+              <a:t>22.10.2022</a:t>
             </a:fld>
             <a:endParaRPr lang="de-AT"/>
           </a:p>
@@ -13912,7 +13947,7 @@
           <a:p>
             <a:fld id="{12BA8DF8-1EF7-4B92-AE3B-451C7066014D}" type="datetime1">
               <a:rPr lang="de-AT" smtClean="0"/>
-              <a:t>18.03.2022</a:t>
+              <a:t>22.10.2022</a:t>
             </a:fld>
             <a:endParaRPr lang="de-AT"/>
           </a:p>
@@ -14122,7 +14157,7 @@
           <a:p>
             <a:fld id="{4A88ADED-F77F-4C3A-9782-F50B8247FB72}" type="datetime1">
               <a:rPr lang="de-AT" smtClean="0"/>
-              <a:t>18.03.2022</a:t>
+              <a:t>22.10.2022</a:t>
             </a:fld>
             <a:endParaRPr lang="de-AT"/>
           </a:p>
@@ -14322,7 +14357,7 @@
           <a:p>
             <a:fld id="{0FB0CD05-15AB-4463-8B74-34F02B6F4B78}" type="datetime1">
               <a:rPr lang="de-AT" smtClean="0"/>
-              <a:t>18.03.2022</a:t>
+              <a:t>22.10.2022</a:t>
             </a:fld>
             <a:endParaRPr lang="de-AT"/>
           </a:p>
@@ -14602,7 +14637,7 @@
           <a:p>
             <a:fld id="{19FC0308-FB4F-4FC3-85ED-1D3708B4786A}" type="datetime1">
               <a:rPr lang="de-AT" smtClean="0"/>
-              <a:t>18.03.2022</a:t>
+              <a:t>22.10.2022</a:t>
             </a:fld>
             <a:endParaRPr lang="de-AT"/>
           </a:p>
@@ -14874,7 +14909,7 @@
           <a:p>
             <a:fld id="{5E20FD88-E2E4-466D-AB5C-F4AB14FD2E5A}" type="datetime1">
               <a:rPr lang="de-AT" smtClean="0"/>
-              <a:t>18.03.2022</a:t>
+              <a:t>22.10.2022</a:t>
             </a:fld>
             <a:endParaRPr lang="de-AT"/>
           </a:p>
@@ -15293,7 +15328,7 @@
           <a:p>
             <a:fld id="{5D9DC754-7964-4780-BA5C-2540644978F1}" type="datetime1">
               <a:rPr lang="de-AT" smtClean="0"/>
-              <a:t>18.03.2022</a:t>
+              <a:t>22.10.2022</a:t>
             </a:fld>
             <a:endParaRPr lang="de-AT"/>
           </a:p>
@@ -15439,7 +15474,7 @@
           <a:p>
             <a:fld id="{CCC9F2E3-D8FF-4262-843C-6A02B860818A}" type="datetime1">
               <a:rPr lang="de-AT" smtClean="0"/>
-              <a:t>18.03.2022</a:t>
+              <a:t>22.10.2022</a:t>
             </a:fld>
             <a:endParaRPr lang="de-AT"/>
           </a:p>
@@ -15649,7 +15684,7 @@
           <a:p>
             <a:fld id="{CFE5A437-92C8-44FE-B498-B478F63EB75F}" type="datetime1">
               <a:rPr lang="de-AT" smtClean="0"/>
-              <a:t>18.03.2022</a:t>
+              <a:t>22.10.2022</a:t>
             </a:fld>
             <a:endParaRPr lang="de-AT"/>
           </a:p>
@@ -15966,7 +16001,7 @@
           <a:p>
             <a:fld id="{09367D3E-12BE-41C6-B73B-856BFBBA4990}" type="datetime1">
               <a:rPr lang="de-AT" smtClean="0"/>
-              <a:t>18.03.2022</a:t>
+              <a:t>22.10.2022</a:t>
             </a:fld>
             <a:endParaRPr lang="de-AT"/>
           </a:p>
@@ -16209,7 +16244,7 @@
           <a:p>
             <a:fld id="{A2E2E334-F18E-4AAC-ADA5-E029241BF88C}" type="datetime1">
               <a:rPr lang="de-AT" smtClean="0"/>
-              <a:t>18.03.2022</a:t>
+              <a:t>22.10.2022</a:t>
             </a:fld>
             <a:endParaRPr lang="de-AT" dirty="0"/>
           </a:p>
@@ -16748,7 +16783,7 @@
         </p:nvSpPr>
         <p:spPr>
           <a:xfrm>
-            <a:off x="2709862" y="6306206"/>
+            <a:off x="2709862" y="6349165"/>
             <a:ext cx="6639831" cy="369332"/>
           </a:xfrm>
           <a:prstGeom prst="rect">
@@ -16764,7 +16799,7 @@
           <a:p>
             <a:r>
               <a:rPr lang="de-DE" dirty="0"/>
-              <a:t>Source: Verizon 2021 Data </a:t>
+              <a:t>Source: Verizon 2022 Data </a:t>
             </a:r>
             <a:r>
               <a:rPr lang="de-DE" dirty="0" err="1"/>
@@ -16780,10 +16815,10 @@
       </p:sp>
       <p:pic>
         <p:nvPicPr>
-          <p:cNvPr id="6" name="Grafik 5">
+          <p:cNvPr id="4" name="Grafik 3">
             <a:extLst>
               <a:ext uri="{FF2B5EF4-FFF2-40B4-BE49-F238E27FC236}">
-                <a16:creationId xmlns:a16="http://schemas.microsoft.com/office/drawing/2014/main" id="{475975E8-5C61-451D-AC6E-C722FFD810FD}"/>
+                <a16:creationId xmlns:a16="http://schemas.microsoft.com/office/drawing/2014/main" id="{A552AAE4-A154-71E7-832D-5107534AC654}"/>
               </a:ext>
             </a:extLst>
           </p:cNvPr>
@@ -16800,8 +16835,8 @@
         </p:blipFill>
         <p:spPr>
           <a:xfrm>
-            <a:off x="2328755" y="182462"/>
-            <a:ext cx="3232539" cy="6133684"/>
+            <a:off x="922960" y="5575918"/>
+            <a:ext cx="2216264" cy="730288"/>
           </a:xfrm>
           <a:prstGeom prst="rect">
             <a:avLst/>
@@ -16810,10 +16845,10 @@
       </p:pic>
       <p:pic>
         <p:nvPicPr>
-          <p:cNvPr id="8" name="Grafik 7">
+          <p:cNvPr id="7" name="Grafik 6">
             <a:extLst>
               <a:ext uri="{FF2B5EF4-FFF2-40B4-BE49-F238E27FC236}">
-                <a16:creationId xmlns:a16="http://schemas.microsoft.com/office/drawing/2014/main" id="{68512492-A59E-408F-94DD-BF7FE9B3AC05}"/>
+                <a16:creationId xmlns:a16="http://schemas.microsoft.com/office/drawing/2014/main" id="{41CF4DB8-C960-AEBF-22A2-72DC53532E2D}"/>
               </a:ext>
             </a:extLst>
           </p:cNvPr>
@@ -16830,8 +16865,68 @@
         </p:blipFill>
         <p:spPr>
           <a:xfrm>
-            <a:off x="6096000" y="182462"/>
-            <a:ext cx="3524518" cy="6123212"/>
+            <a:off x="8580039" y="5598264"/>
+            <a:ext cx="2178162" cy="711237"/>
+          </a:xfrm>
+          <a:prstGeom prst="rect">
+            <a:avLst/>
+          </a:prstGeom>
+        </p:spPr>
+      </p:pic>
+      <p:pic>
+        <p:nvPicPr>
+          <p:cNvPr id="10" name="Grafik 9">
+            <a:extLst>
+              <a:ext uri="{FF2B5EF4-FFF2-40B4-BE49-F238E27FC236}">
+                <a16:creationId xmlns:a16="http://schemas.microsoft.com/office/drawing/2014/main" id="{756C5171-F06B-32D0-8BFC-452D6A07C1D2}"/>
+              </a:ext>
+            </a:extLst>
+          </p:cNvPr>
+          <p:cNvPicPr>
+            <a:picLocks noChangeAspect="1"/>
+          </p:cNvPicPr>
+          <p:nvPr/>
+        </p:nvPicPr>
+        <p:blipFill>
+          <a:blip r:embed="rId5"/>
+          <a:stretch>
+            <a:fillRect/>
+          </a:stretch>
+        </p:blipFill>
+        <p:spPr>
+          <a:xfrm>
+            <a:off x="3326964" y="49096"/>
+            <a:ext cx="2230842" cy="6257110"/>
+          </a:xfrm>
+          <a:prstGeom prst="rect">
+            <a:avLst/>
+          </a:prstGeom>
+        </p:spPr>
+      </p:pic>
+      <p:pic>
+        <p:nvPicPr>
+          <p:cNvPr id="12" name="Grafik 11">
+            <a:extLst>
+              <a:ext uri="{FF2B5EF4-FFF2-40B4-BE49-F238E27FC236}">
+                <a16:creationId xmlns:a16="http://schemas.microsoft.com/office/drawing/2014/main" id="{42448AD6-DDB9-2F4F-A359-A12AF62FE8FF}"/>
+              </a:ext>
+            </a:extLst>
+          </p:cNvPr>
+          <p:cNvPicPr>
+            <a:picLocks noChangeAspect="1"/>
+          </p:cNvPicPr>
+          <p:nvPr/>
+        </p:nvPicPr>
+        <p:blipFill>
+          <a:blip r:embed="rId6"/>
+          <a:stretch>
+            <a:fillRect/>
+          </a:stretch>
+        </p:blipFill>
+        <p:spPr>
+          <a:xfrm>
+            <a:off x="6027362" y="49096"/>
+            <a:ext cx="2364937" cy="6257110"/>
           </a:xfrm>
           <a:prstGeom prst="rect">
             <a:avLst/>
@@ -16841,7 +16936,7 @@
     </p:spTree>
     <p:extLst>
       <p:ext uri="{BB962C8B-B14F-4D97-AF65-F5344CB8AC3E}">
-        <p14:creationId xmlns:p14="http://schemas.microsoft.com/office/powerpoint/2010/main" val="4238467972"/>
+        <p14:creationId xmlns:p14="http://schemas.microsoft.com/office/powerpoint/2010/main" val="2654064379"/>
       </p:ext>
     </p:extLst>
   </p:cSld>
@@ -16882,7 +16977,34 @@
                                           </p:stCondLst>
                                         </p:cTn>
                                         <p:tgtEl>
-                                          <p:spTgt spid="6"/>
+                                          <p:spTgt spid="10"/>
+                                        </p:tgtEl>
+                                        <p:attrNameLst>
+                                          <p:attrName>style.visibility</p:attrName>
+                                        </p:attrNameLst>
+                                      </p:cBhvr>
+                                      <p:to>
+                                        <p:strVal val="visible"/>
+                                      </p:to>
+                                    </p:set>
+                                  </p:childTnLst>
+                                </p:cTn>
+                              </p:par>
+                              <p:par>
+                                <p:cTn id="7" presetID="1" presetClass="entr" presetSubtype="0" fill="hold" nodeType="withEffect">
+                                  <p:stCondLst>
+                                    <p:cond delay="0"/>
+                                  </p:stCondLst>
+                                  <p:childTnLst>
+                                    <p:set>
+                                      <p:cBhvr>
+                                        <p:cTn id="8" dur="1" fill="hold">
+                                          <p:stCondLst>
+                                            <p:cond delay="0"/>
+                                          </p:stCondLst>
+                                        </p:cTn>
+                                        <p:tgtEl>
+                                          <p:spTgt spid="4"/>
                                         </p:tgtEl>
                                         <p:attrNameLst>
                                           <p:attrName>style.visibility</p:attrName>
@@ -16902,32 +17024,59 @@
                     </p:cTn>
                   </p:par>
                   <p:par>
-                    <p:cTn id="7" fill="hold">
+                    <p:cTn id="9" fill="hold">
                       <p:stCondLst>
                         <p:cond delay="indefinite"/>
                       </p:stCondLst>
                       <p:childTnLst>
                         <p:par>
-                          <p:cTn id="8" fill="hold">
+                          <p:cTn id="10" fill="hold">
                             <p:stCondLst>
                               <p:cond delay="0"/>
                             </p:stCondLst>
                             <p:childTnLst>
                               <p:par>
-                                <p:cTn id="9" presetID="1" presetClass="entr" presetSubtype="0" fill="hold" nodeType="clickEffect">
+                                <p:cTn id="11" presetID="1" presetClass="entr" presetSubtype="0" fill="hold" nodeType="clickEffect">
                                   <p:stCondLst>
                                     <p:cond delay="0"/>
                                   </p:stCondLst>
                                   <p:childTnLst>
                                     <p:set>
                                       <p:cBhvr>
-                                        <p:cTn id="10" dur="1" fill="hold">
+                                        <p:cTn id="12" dur="1" fill="hold">
                                           <p:stCondLst>
                                             <p:cond delay="0"/>
                                           </p:stCondLst>
                                         </p:cTn>
                                         <p:tgtEl>
-                                          <p:spTgt spid="8"/>
+                                          <p:spTgt spid="12"/>
+                                        </p:tgtEl>
+                                        <p:attrNameLst>
+                                          <p:attrName>style.visibility</p:attrName>
+                                        </p:attrNameLst>
+                                      </p:cBhvr>
+                                      <p:to>
+                                        <p:strVal val="visible"/>
+                                      </p:to>
+                                    </p:set>
+                                  </p:childTnLst>
+                                </p:cTn>
+                              </p:par>
+                              <p:par>
+                                <p:cTn id="13" presetID="1" presetClass="entr" presetSubtype="0" fill="hold" nodeType="withEffect">
+                                  <p:stCondLst>
+                                    <p:cond delay="0"/>
+                                  </p:stCondLst>
+                                  <p:childTnLst>
+                                    <p:set>
+                                      <p:cBhvr>
+                                        <p:cTn id="14" dur="1" fill="hold">
+                                          <p:stCondLst>
+                                            <p:cond delay="0"/>
+                                          </p:stCondLst>
+                                        </p:cTn>
+                                        <p:tgtEl>
+                                          <p:spTgt spid="7"/>
                                         </p:tgtEl>
                                         <p:attrNameLst>
                                           <p:attrName>style.visibility</p:attrName>

</xml_diff>

<commit_message>
Added 'Quiz Time' slides so I don't forget quizes anymore.
</commit_message>
<xml_diff>
--- a/slides/1_Intro_and_Motivation.pptx
+++ b/slides/1_Intro_and_Motivation.pptx
@@ -144,10 +144,25 @@
   <pc:docChgLst>
     <pc:chgData name="Daniel Schwarz" userId="5bb35bb8-905a-4742-88d9-33d9089732e7" providerId="ADAL" clId="{B57C1C39-A402-42CC-BD80-18349EE1F998}"/>
     <pc:docChg chg="undo custSel addSld delSld modSld">
-      <pc:chgData name="Daniel Schwarz" userId="5bb35bb8-905a-4742-88d9-33d9089732e7" providerId="ADAL" clId="{B57C1C39-A402-42CC-BD80-18349EE1F998}" dt="2022-10-22T11:53:32.609" v="21" actId="47"/>
+      <pc:chgData name="Daniel Schwarz" userId="5bb35bb8-905a-4742-88d9-33d9089732e7" providerId="ADAL" clId="{B57C1C39-A402-42CC-BD80-18349EE1F998}" dt="2023-04-13T16:14:52.322" v="58" actId="1076"/>
       <pc:docMkLst>
         <pc:docMk/>
       </pc:docMkLst>
+      <pc:sldChg chg="modSp mod">
+        <pc:chgData name="Daniel Schwarz" userId="5bb35bb8-905a-4742-88d9-33d9089732e7" providerId="ADAL" clId="{B57C1C39-A402-42CC-BD80-18349EE1F998}" dt="2023-04-13T16:14:52.322" v="58" actId="1076"/>
+        <pc:sldMkLst>
+          <pc:docMk/>
+          <pc:sldMk cId="1739608523" sldId="293"/>
+        </pc:sldMkLst>
+        <pc:spChg chg="mod">
+          <ac:chgData name="Daniel Schwarz" userId="5bb35bb8-905a-4742-88d9-33d9089732e7" providerId="ADAL" clId="{B57C1C39-A402-42CC-BD80-18349EE1F998}" dt="2023-04-13T16:14:52.322" v="58" actId="1076"/>
+          <ac:spMkLst>
+            <pc:docMk/>
+            <pc:sldMk cId="1739608523" sldId="293"/>
+            <ac:spMk id="4" creationId="{44EC7A9A-36A6-4DB9-97CD-960FEC338F90}"/>
+          </ac:spMkLst>
+        </pc:spChg>
+      </pc:sldChg>
       <pc:sldChg chg="add del">
         <pc:chgData name="Daniel Schwarz" userId="5bb35bb8-905a-4742-88d9-33d9089732e7" providerId="ADAL" clId="{B57C1C39-A402-42CC-BD80-18349EE1F998}" dt="2022-10-22T11:52:16.797" v="19" actId="47"/>
         <pc:sldMkLst>
@@ -11775,7 +11790,7 @@
           <a:p>
             <a:fld id="{E9A67217-929B-4143-94A9-94A0B9892952}" type="datetimeFigureOut">
               <a:rPr lang="de-AT" smtClean="0"/>
-              <a:t>22.10.2022</a:t>
+              <a:t>13.04.2023</a:t>
             </a:fld>
             <a:endParaRPr lang="de-AT"/>
           </a:p>
@@ -13453,7 +13468,7 @@
           <a:p>
             <a:fld id="{7F00868D-D319-4986-8E30-C82AA1E82F34}" type="datetime1">
               <a:rPr lang="de-AT" smtClean="0"/>
-              <a:t>22.10.2022</a:t>
+              <a:t>13.04.2023</a:t>
             </a:fld>
             <a:endParaRPr lang="de-AT"/>
           </a:p>
@@ -13747,7 +13762,7 @@
           <a:p>
             <a:fld id="{DFC8F35A-701B-4028-8059-58ABBF80CA73}" type="datetime1">
               <a:rPr lang="de-AT" smtClean="0"/>
-              <a:t>22.10.2022</a:t>
+              <a:t>13.04.2023</a:t>
             </a:fld>
             <a:endParaRPr lang="de-AT"/>
           </a:p>
@@ -13947,7 +13962,7 @@
           <a:p>
             <a:fld id="{12BA8DF8-1EF7-4B92-AE3B-451C7066014D}" type="datetime1">
               <a:rPr lang="de-AT" smtClean="0"/>
-              <a:t>22.10.2022</a:t>
+              <a:t>13.04.2023</a:t>
             </a:fld>
             <a:endParaRPr lang="de-AT"/>
           </a:p>
@@ -14157,7 +14172,7 @@
           <a:p>
             <a:fld id="{4A88ADED-F77F-4C3A-9782-F50B8247FB72}" type="datetime1">
               <a:rPr lang="de-AT" smtClean="0"/>
-              <a:t>22.10.2022</a:t>
+              <a:t>13.04.2023</a:t>
             </a:fld>
             <a:endParaRPr lang="de-AT"/>
           </a:p>
@@ -14357,7 +14372,7 @@
           <a:p>
             <a:fld id="{0FB0CD05-15AB-4463-8B74-34F02B6F4B78}" type="datetime1">
               <a:rPr lang="de-AT" smtClean="0"/>
-              <a:t>22.10.2022</a:t>
+              <a:t>13.04.2023</a:t>
             </a:fld>
             <a:endParaRPr lang="de-AT"/>
           </a:p>
@@ -14637,7 +14652,7 @@
           <a:p>
             <a:fld id="{19FC0308-FB4F-4FC3-85ED-1D3708B4786A}" type="datetime1">
               <a:rPr lang="de-AT" smtClean="0"/>
-              <a:t>22.10.2022</a:t>
+              <a:t>13.04.2023</a:t>
             </a:fld>
             <a:endParaRPr lang="de-AT"/>
           </a:p>
@@ -14909,7 +14924,7 @@
           <a:p>
             <a:fld id="{5E20FD88-E2E4-466D-AB5C-F4AB14FD2E5A}" type="datetime1">
               <a:rPr lang="de-AT" smtClean="0"/>
-              <a:t>22.10.2022</a:t>
+              <a:t>13.04.2023</a:t>
             </a:fld>
             <a:endParaRPr lang="de-AT"/>
           </a:p>
@@ -15328,7 +15343,7 @@
           <a:p>
             <a:fld id="{5D9DC754-7964-4780-BA5C-2540644978F1}" type="datetime1">
               <a:rPr lang="de-AT" smtClean="0"/>
-              <a:t>22.10.2022</a:t>
+              <a:t>13.04.2023</a:t>
             </a:fld>
             <a:endParaRPr lang="de-AT"/>
           </a:p>
@@ -15474,7 +15489,7 @@
           <a:p>
             <a:fld id="{CCC9F2E3-D8FF-4262-843C-6A02B860818A}" type="datetime1">
               <a:rPr lang="de-AT" smtClean="0"/>
-              <a:t>22.10.2022</a:t>
+              <a:t>13.04.2023</a:t>
             </a:fld>
             <a:endParaRPr lang="de-AT"/>
           </a:p>
@@ -15684,7 +15699,7 @@
           <a:p>
             <a:fld id="{CFE5A437-92C8-44FE-B498-B478F63EB75F}" type="datetime1">
               <a:rPr lang="de-AT" smtClean="0"/>
-              <a:t>22.10.2022</a:t>
+              <a:t>13.04.2023</a:t>
             </a:fld>
             <a:endParaRPr lang="de-AT"/>
           </a:p>
@@ -16001,7 +16016,7 @@
           <a:p>
             <a:fld id="{09367D3E-12BE-41C6-B73B-856BFBBA4990}" type="datetime1">
               <a:rPr lang="de-AT" smtClean="0"/>
-              <a:t>22.10.2022</a:t>
+              <a:t>13.04.2023</a:t>
             </a:fld>
             <a:endParaRPr lang="de-AT"/>
           </a:p>
@@ -16244,7 +16259,7 @@
           <a:p>
             <a:fld id="{A2E2E334-F18E-4AAC-ADA5-E029241BF88C}" type="datetime1">
               <a:rPr lang="de-AT" smtClean="0"/>
-              <a:t>22.10.2022</a:t>
+              <a:t>13.04.2023</a:t>
             </a:fld>
             <a:endParaRPr lang="de-AT" dirty="0"/>
           </a:p>
@@ -22680,8 +22695,8 @@
         </p:nvSpPr>
         <p:spPr>
           <a:xfrm>
-            <a:off x="3098131" y="2634867"/>
-            <a:ext cx="5995737" cy="1255621"/>
+            <a:off x="3098131" y="2370979"/>
+            <a:ext cx="5995737" cy="3232022"/>
           </a:xfrm>
           <a:prstGeom prst="rect">
             <a:avLst/>
@@ -22879,6 +22894,16 @@
             <a:r>
               <a:rPr lang="de-DE" sz="6600" dirty="0"/>
               <a:t>?</a:t>
+            </a:r>
+          </a:p>
+          <a:p>
+            <a:pPr marL="0" indent="0" algn="ctr">
+              <a:buFont typeface="Arial" panose="020B0604020202020204" pitchFamily="34" charset="0"/>
+              <a:buNone/>
+            </a:pPr>
+            <a:r>
+              <a:rPr lang="de-DE" sz="6600" dirty="0"/>
+              <a:t>(Quiz Time)</a:t>
             </a:r>
             <a:endParaRPr lang="de-AT" sz="6600" dirty="0"/>
           </a:p>

</xml_diff>

<commit_message>
updated the verizon dbir to 2023
</commit_message>
<xml_diff>
--- a/slides/1_Intro_and_Motivation.pptx
+++ b/slides/1_Intro_and_Motivation.pptx
@@ -134,7 +134,7 @@
 <file path=ppt/revisionInfo.xml><?xml version="1.0" encoding="utf-8"?>
 <p1510:revInfo xmlns:a="http://schemas.openxmlformats.org/drawingml/2006/main" xmlns:r="http://schemas.openxmlformats.org/officeDocument/2006/relationships" xmlns:p1510="http://schemas.microsoft.com/office/powerpoint/2015/10/main">
   <p1510:revLst>
-    <p1510:client id="{B57C1C39-A402-42CC-BD80-18349EE1F998}" v="6" dt="2022-10-22T11:53:29.731"/>
+    <p1510:client id="{B57C1C39-A402-42CC-BD80-18349EE1F998}" v="7" dt="2023-08-15T09:28:51.997"/>
   </p1510:revLst>
 </p1510:revInfo>
 </file>
@@ -144,7 +144,7 @@
   <pc:docChgLst>
     <pc:chgData name="Daniel Schwarz" userId="5bb35bb8-905a-4742-88d9-33d9089732e7" providerId="ADAL" clId="{B57C1C39-A402-42CC-BD80-18349EE1F998}"/>
     <pc:docChg chg="undo custSel addSld delSld modSld">
-      <pc:chgData name="Daniel Schwarz" userId="5bb35bb8-905a-4742-88d9-33d9089732e7" providerId="ADAL" clId="{B57C1C39-A402-42CC-BD80-18349EE1F998}" dt="2023-04-13T16:14:52.322" v="58" actId="1076"/>
+      <pc:chgData name="Daniel Schwarz" userId="5bb35bb8-905a-4742-88d9-33d9089732e7" providerId="ADAL" clId="{B57C1C39-A402-42CC-BD80-18349EE1F998}" dt="2023-08-15T09:29:55.328" v="109" actId="1076"/>
       <pc:docMkLst>
         <pc:docMk/>
       </pc:docMkLst>
@@ -246,12 +246,75 @@
           <pc:sldMk cId="180264529" sldId="299"/>
         </pc:sldMkLst>
       </pc:sldChg>
-      <pc:sldChg chg="add">
-        <pc:chgData name="Daniel Schwarz" userId="5bb35bb8-905a-4742-88d9-33d9089732e7" providerId="ADAL" clId="{B57C1C39-A402-42CC-BD80-18349EE1F998}" dt="2022-10-22T11:53:29.721" v="20"/>
+      <pc:sldChg chg="modSp mod">
+        <pc:chgData name="Daniel Schwarz" userId="5bb35bb8-905a-4742-88d9-33d9089732e7" providerId="ADAL" clId="{B57C1C39-A402-42CC-BD80-18349EE1F998}" dt="2023-08-15T09:29:55.328" v="109" actId="1076"/>
+        <pc:sldMkLst>
+          <pc:docMk/>
+          <pc:sldMk cId="1513339557" sldId="302"/>
+        </pc:sldMkLst>
+        <pc:spChg chg="mod">
+          <ac:chgData name="Daniel Schwarz" userId="5bb35bb8-905a-4742-88d9-33d9089732e7" providerId="ADAL" clId="{B57C1C39-A402-42CC-BD80-18349EE1F998}" dt="2023-08-15T09:29:55.328" v="109" actId="1076"/>
+          <ac:spMkLst>
+            <pc:docMk/>
+            <pc:sldMk cId="1513339557" sldId="302"/>
+            <ac:spMk id="3" creationId="{9A129551-8658-48CD-9358-11394084CD25}"/>
+          </ac:spMkLst>
+        </pc:spChg>
+      </pc:sldChg>
+      <pc:sldChg chg="addSp delSp modSp add mod addAnim delAnim">
+        <pc:chgData name="Daniel Schwarz" userId="5bb35bb8-905a-4742-88d9-33d9089732e7" providerId="ADAL" clId="{B57C1C39-A402-42CC-BD80-18349EE1F998}" dt="2023-08-15T09:29:10.207" v="99" actId="1076"/>
         <pc:sldMkLst>
           <pc:docMk/>
           <pc:sldMk cId="2654064379" sldId="309"/>
         </pc:sldMkLst>
+        <pc:spChg chg="mod">
+          <ac:chgData name="Daniel Schwarz" userId="5bb35bb8-905a-4742-88d9-33d9089732e7" providerId="ADAL" clId="{B57C1C39-A402-42CC-BD80-18349EE1F998}" dt="2023-08-15T09:28:31.271" v="60" actId="20577"/>
+          <ac:spMkLst>
+            <pc:docMk/>
+            <pc:sldMk cId="2654064379" sldId="309"/>
+            <ac:spMk id="3" creationId="{0FDBC933-DDE8-4D53-90BD-BE23D32B2A4F}"/>
+          </ac:spMkLst>
+        </pc:spChg>
+        <pc:picChg chg="add mod">
+          <ac:chgData name="Daniel Schwarz" userId="5bb35bb8-905a-4742-88d9-33d9089732e7" providerId="ADAL" clId="{B57C1C39-A402-42CC-BD80-18349EE1F998}" dt="2023-08-15T09:29:06.537" v="98" actId="1076"/>
+          <ac:picMkLst>
+            <pc:docMk/>
+            <pc:sldMk cId="2654064379" sldId="309"/>
+            <ac:picMk id="2" creationId="{ED470617-44C9-95CF-8F44-F5FCB9A7C2B9}"/>
+          </ac:picMkLst>
+        </pc:picChg>
+        <pc:picChg chg="add del mod">
+          <ac:chgData name="Daniel Schwarz" userId="5bb35bb8-905a-4742-88d9-33d9089732e7" providerId="ADAL" clId="{B57C1C39-A402-42CC-BD80-18349EE1F998}" dt="2023-08-15T09:29:10.207" v="99" actId="1076"/>
+          <ac:picMkLst>
+            <pc:docMk/>
+            <pc:sldMk cId="2654064379" sldId="309"/>
+            <ac:picMk id="4" creationId="{A552AAE4-A154-71E7-832D-5107534AC654}"/>
+          </ac:picMkLst>
+        </pc:picChg>
+        <pc:picChg chg="del">
+          <ac:chgData name="Daniel Schwarz" userId="5bb35bb8-905a-4742-88d9-33d9089732e7" providerId="ADAL" clId="{B57C1C39-A402-42CC-BD80-18349EE1F998}" dt="2023-08-15T09:28:36.569" v="62" actId="478"/>
+          <ac:picMkLst>
+            <pc:docMk/>
+            <pc:sldMk cId="2654064379" sldId="309"/>
+            <ac:picMk id="7" creationId="{41CF4DB8-C960-AEBF-22A2-72DC53532E2D}"/>
+          </ac:picMkLst>
+        </pc:picChg>
+        <pc:picChg chg="del">
+          <ac:chgData name="Daniel Schwarz" userId="5bb35bb8-905a-4742-88d9-33d9089732e7" providerId="ADAL" clId="{B57C1C39-A402-42CC-BD80-18349EE1F998}" dt="2023-08-15T09:28:38.113" v="63" actId="478"/>
+          <ac:picMkLst>
+            <pc:docMk/>
+            <pc:sldMk cId="2654064379" sldId="309"/>
+            <ac:picMk id="10" creationId="{756C5171-F06B-32D0-8BFC-452D6A07C1D2}"/>
+          </ac:picMkLst>
+        </pc:picChg>
+        <pc:picChg chg="del">
+          <ac:chgData name="Daniel Schwarz" userId="5bb35bb8-905a-4742-88d9-33d9089732e7" providerId="ADAL" clId="{B57C1C39-A402-42CC-BD80-18349EE1F998}" dt="2023-08-15T09:28:35.697" v="61" actId="478"/>
+          <ac:picMkLst>
+            <pc:docMk/>
+            <pc:sldMk cId="2654064379" sldId="309"/>
+            <ac:picMk id="12" creationId="{42448AD6-DDB9-2F4F-A359-A12AF62FE8FF}"/>
+          </ac:picMkLst>
+        </pc:picChg>
       </pc:sldChg>
     </pc:docChg>
   </pc:docChgLst>
@@ -11790,7 +11853,7 @@
           <a:p>
             <a:fld id="{E9A67217-929B-4143-94A9-94A0B9892952}" type="datetimeFigureOut">
               <a:rPr lang="de-AT" smtClean="0"/>
-              <a:t>13.04.2023</a:t>
+              <a:t>15.08.2023</a:t>
             </a:fld>
             <a:endParaRPr lang="de-AT"/>
           </a:p>
@@ -13468,7 +13531,7 @@
           <a:p>
             <a:fld id="{7F00868D-D319-4986-8E30-C82AA1E82F34}" type="datetime1">
               <a:rPr lang="de-AT" smtClean="0"/>
-              <a:t>13.04.2023</a:t>
+              <a:t>15.08.2023</a:t>
             </a:fld>
             <a:endParaRPr lang="de-AT"/>
           </a:p>
@@ -13762,7 +13825,7 @@
           <a:p>
             <a:fld id="{DFC8F35A-701B-4028-8059-58ABBF80CA73}" type="datetime1">
               <a:rPr lang="de-AT" smtClean="0"/>
-              <a:t>13.04.2023</a:t>
+              <a:t>15.08.2023</a:t>
             </a:fld>
             <a:endParaRPr lang="de-AT"/>
           </a:p>
@@ -13962,7 +14025,7 @@
           <a:p>
             <a:fld id="{12BA8DF8-1EF7-4B92-AE3B-451C7066014D}" type="datetime1">
               <a:rPr lang="de-AT" smtClean="0"/>
-              <a:t>13.04.2023</a:t>
+              <a:t>15.08.2023</a:t>
             </a:fld>
             <a:endParaRPr lang="de-AT"/>
           </a:p>
@@ -14172,7 +14235,7 @@
           <a:p>
             <a:fld id="{4A88ADED-F77F-4C3A-9782-F50B8247FB72}" type="datetime1">
               <a:rPr lang="de-AT" smtClean="0"/>
-              <a:t>13.04.2023</a:t>
+              <a:t>15.08.2023</a:t>
             </a:fld>
             <a:endParaRPr lang="de-AT"/>
           </a:p>
@@ -14372,7 +14435,7 @@
           <a:p>
             <a:fld id="{0FB0CD05-15AB-4463-8B74-34F02B6F4B78}" type="datetime1">
               <a:rPr lang="de-AT" smtClean="0"/>
-              <a:t>13.04.2023</a:t>
+              <a:t>15.08.2023</a:t>
             </a:fld>
             <a:endParaRPr lang="de-AT"/>
           </a:p>
@@ -14652,7 +14715,7 @@
           <a:p>
             <a:fld id="{19FC0308-FB4F-4FC3-85ED-1D3708B4786A}" type="datetime1">
               <a:rPr lang="de-AT" smtClean="0"/>
-              <a:t>13.04.2023</a:t>
+              <a:t>15.08.2023</a:t>
             </a:fld>
             <a:endParaRPr lang="de-AT"/>
           </a:p>
@@ -14924,7 +14987,7 @@
           <a:p>
             <a:fld id="{5E20FD88-E2E4-466D-AB5C-F4AB14FD2E5A}" type="datetime1">
               <a:rPr lang="de-AT" smtClean="0"/>
-              <a:t>13.04.2023</a:t>
+              <a:t>15.08.2023</a:t>
             </a:fld>
             <a:endParaRPr lang="de-AT"/>
           </a:p>
@@ -15343,7 +15406,7 @@
           <a:p>
             <a:fld id="{5D9DC754-7964-4780-BA5C-2540644978F1}" type="datetime1">
               <a:rPr lang="de-AT" smtClean="0"/>
-              <a:t>13.04.2023</a:t>
+              <a:t>15.08.2023</a:t>
             </a:fld>
             <a:endParaRPr lang="de-AT"/>
           </a:p>
@@ -15489,7 +15552,7 @@
           <a:p>
             <a:fld id="{CCC9F2E3-D8FF-4262-843C-6A02B860818A}" type="datetime1">
               <a:rPr lang="de-AT" smtClean="0"/>
-              <a:t>13.04.2023</a:t>
+              <a:t>15.08.2023</a:t>
             </a:fld>
             <a:endParaRPr lang="de-AT"/>
           </a:p>
@@ -15699,7 +15762,7 @@
           <a:p>
             <a:fld id="{CFE5A437-92C8-44FE-B498-B478F63EB75F}" type="datetime1">
               <a:rPr lang="de-AT" smtClean="0"/>
-              <a:t>13.04.2023</a:t>
+              <a:t>15.08.2023</a:t>
             </a:fld>
             <a:endParaRPr lang="de-AT"/>
           </a:p>
@@ -16016,7 +16079,7 @@
           <a:p>
             <a:fld id="{09367D3E-12BE-41C6-B73B-856BFBBA4990}" type="datetime1">
               <a:rPr lang="de-AT" smtClean="0"/>
-              <a:t>13.04.2023</a:t>
+              <a:t>15.08.2023</a:t>
             </a:fld>
             <a:endParaRPr lang="de-AT"/>
           </a:p>
@@ -16259,7 +16322,7 @@
           <a:p>
             <a:fld id="{A2E2E334-F18E-4AAC-ADA5-E029241BF88C}" type="datetime1">
               <a:rPr lang="de-AT" smtClean="0"/>
-              <a:t>13.04.2023</a:t>
+              <a:t>15.08.2023</a:t>
             </a:fld>
             <a:endParaRPr lang="de-AT" dirty="0"/>
           </a:p>
@@ -16814,7 +16877,7 @@
           <a:p>
             <a:r>
               <a:rPr lang="de-DE" dirty="0"/>
-              <a:t>Source: Verizon 2022 Data </a:t>
+              <a:t>Source: Verizon 2023 Data </a:t>
             </a:r>
             <a:r>
               <a:rPr lang="de-DE" dirty="0" err="1"/>
@@ -16850,7 +16913,7 @@
         </p:blipFill>
         <p:spPr>
           <a:xfrm>
-            <a:off x="922960" y="5575918"/>
+            <a:off x="7342171" y="5596375"/>
             <a:ext cx="2216264" cy="730288"/>
           </a:xfrm>
           <a:prstGeom prst="rect">
@@ -16860,10 +16923,10 @@
       </p:pic>
       <p:pic>
         <p:nvPicPr>
-          <p:cNvPr id="7" name="Grafik 6">
+          <p:cNvPr id="2" name="Grafik 1">
             <a:extLst>
               <a:ext uri="{FF2B5EF4-FFF2-40B4-BE49-F238E27FC236}">
-                <a16:creationId xmlns:a16="http://schemas.microsoft.com/office/drawing/2014/main" id="{41CF4DB8-C960-AEBF-22A2-72DC53532E2D}"/>
+                <a16:creationId xmlns:a16="http://schemas.microsoft.com/office/drawing/2014/main" id="{ED470617-44C9-95CF-8F44-F5FCB9A7C2B9}"/>
               </a:ext>
             </a:extLst>
           </p:cNvPr>
@@ -16880,68 +16943,8 @@
         </p:blipFill>
         <p:spPr>
           <a:xfrm>
-            <a:off x="8580039" y="5598264"/>
-            <a:ext cx="2178162" cy="711237"/>
-          </a:xfrm>
-          <a:prstGeom prst="rect">
-            <a:avLst/>
-          </a:prstGeom>
-        </p:spPr>
-      </p:pic>
-      <p:pic>
-        <p:nvPicPr>
-          <p:cNvPr id="10" name="Grafik 9">
-            <a:extLst>
-              <a:ext uri="{FF2B5EF4-FFF2-40B4-BE49-F238E27FC236}">
-                <a16:creationId xmlns:a16="http://schemas.microsoft.com/office/drawing/2014/main" id="{756C5171-F06B-32D0-8BFC-452D6A07C1D2}"/>
-              </a:ext>
-            </a:extLst>
-          </p:cNvPr>
-          <p:cNvPicPr>
-            <a:picLocks noChangeAspect="1"/>
-          </p:cNvPicPr>
-          <p:nvPr/>
-        </p:nvPicPr>
-        <p:blipFill>
-          <a:blip r:embed="rId5"/>
-          <a:stretch>
-            <a:fillRect/>
-          </a:stretch>
-        </p:blipFill>
-        <p:spPr>
-          <a:xfrm>
-            <a:off x="3326964" y="49096"/>
-            <a:ext cx="2230842" cy="6257110"/>
-          </a:xfrm>
-          <a:prstGeom prst="rect">
-            <a:avLst/>
-          </a:prstGeom>
-        </p:spPr>
-      </p:pic>
-      <p:pic>
-        <p:nvPicPr>
-          <p:cNvPr id="12" name="Grafik 11">
-            <a:extLst>
-              <a:ext uri="{FF2B5EF4-FFF2-40B4-BE49-F238E27FC236}">
-                <a16:creationId xmlns:a16="http://schemas.microsoft.com/office/drawing/2014/main" id="{42448AD6-DDB9-2F4F-A359-A12AF62FE8FF}"/>
-              </a:ext>
-            </a:extLst>
-          </p:cNvPr>
-          <p:cNvPicPr>
-            <a:picLocks noChangeAspect="1"/>
-          </p:cNvPicPr>
-          <p:nvPr/>
-        </p:nvPicPr>
-        <p:blipFill>
-          <a:blip r:embed="rId6"/>
-          <a:stretch>
-            <a:fillRect/>
-          </a:stretch>
-        </p:blipFill>
-        <p:spPr>
-          <a:xfrm>
-            <a:off x="6027362" y="49096"/>
-            <a:ext cx="2364937" cy="6257110"/>
+            <a:off x="4835187" y="99744"/>
+            <a:ext cx="2389180" cy="6226919"/>
           </a:xfrm>
           <a:prstGeom prst="rect">
             <a:avLst/>
@@ -16970,6 +16973,9 @@
                     <p:cTn id="3" fill="hold">
                       <p:stCondLst>
                         <p:cond delay="indefinite"/>
+                        <p:cond evt="onBegin" delay="0">
+                          <p:tn val="2"/>
+                        </p:cond>
                       </p:stCondLst>
                       <p:childTnLst>
                         <p:par>
@@ -16979,7 +16985,7 @@
                             </p:stCondLst>
                             <p:childTnLst>
                               <p:par>
-                                <p:cTn id="5" presetID="1" presetClass="entr" presetSubtype="0" fill="hold" nodeType="clickEffect">
+                                <p:cTn id="5" presetID="1" presetClass="entr" presetSubtype="0" fill="hold" nodeType="withEffect">
                                   <p:stCondLst>
                                     <p:cond delay="0"/>
                                   </p:stCondLst>
@@ -16992,106 +16998,7 @@
                                           </p:stCondLst>
                                         </p:cTn>
                                         <p:tgtEl>
-                                          <p:spTgt spid="10"/>
-                                        </p:tgtEl>
-                                        <p:attrNameLst>
-                                          <p:attrName>style.visibility</p:attrName>
-                                        </p:attrNameLst>
-                                      </p:cBhvr>
-                                      <p:to>
-                                        <p:strVal val="visible"/>
-                                      </p:to>
-                                    </p:set>
-                                  </p:childTnLst>
-                                </p:cTn>
-                              </p:par>
-                              <p:par>
-                                <p:cTn id="7" presetID="1" presetClass="entr" presetSubtype="0" fill="hold" nodeType="withEffect">
-                                  <p:stCondLst>
-                                    <p:cond delay="0"/>
-                                  </p:stCondLst>
-                                  <p:childTnLst>
-                                    <p:set>
-                                      <p:cBhvr>
-                                        <p:cTn id="8" dur="1" fill="hold">
-                                          <p:stCondLst>
-                                            <p:cond delay="0"/>
-                                          </p:stCondLst>
-                                        </p:cTn>
-                                        <p:tgtEl>
                                           <p:spTgt spid="4"/>
-                                        </p:tgtEl>
-                                        <p:attrNameLst>
-                                          <p:attrName>style.visibility</p:attrName>
-                                        </p:attrNameLst>
-                                      </p:cBhvr>
-                                      <p:to>
-                                        <p:strVal val="visible"/>
-                                      </p:to>
-                                    </p:set>
-                                  </p:childTnLst>
-                                </p:cTn>
-                              </p:par>
-                            </p:childTnLst>
-                          </p:cTn>
-                        </p:par>
-                      </p:childTnLst>
-                    </p:cTn>
-                  </p:par>
-                  <p:par>
-                    <p:cTn id="9" fill="hold">
-                      <p:stCondLst>
-                        <p:cond delay="indefinite"/>
-                      </p:stCondLst>
-                      <p:childTnLst>
-                        <p:par>
-                          <p:cTn id="10" fill="hold">
-                            <p:stCondLst>
-                              <p:cond delay="0"/>
-                            </p:stCondLst>
-                            <p:childTnLst>
-                              <p:par>
-                                <p:cTn id="11" presetID="1" presetClass="entr" presetSubtype="0" fill="hold" nodeType="clickEffect">
-                                  <p:stCondLst>
-                                    <p:cond delay="0"/>
-                                  </p:stCondLst>
-                                  <p:childTnLst>
-                                    <p:set>
-                                      <p:cBhvr>
-                                        <p:cTn id="12" dur="1" fill="hold">
-                                          <p:stCondLst>
-                                            <p:cond delay="0"/>
-                                          </p:stCondLst>
-                                        </p:cTn>
-                                        <p:tgtEl>
-                                          <p:spTgt spid="12"/>
-                                        </p:tgtEl>
-                                        <p:attrNameLst>
-                                          <p:attrName>style.visibility</p:attrName>
-                                        </p:attrNameLst>
-                                      </p:cBhvr>
-                                      <p:to>
-                                        <p:strVal val="visible"/>
-                                      </p:to>
-                                    </p:set>
-                                  </p:childTnLst>
-                                </p:cTn>
-                              </p:par>
-                              <p:par>
-                                <p:cTn id="13" presetID="1" presetClass="entr" presetSubtype="0" fill="hold" nodeType="withEffect">
-                                  <p:stCondLst>
-                                    <p:cond delay="0"/>
-                                  </p:stCondLst>
-                                  <p:childTnLst>
-                                    <p:set>
-                                      <p:cBhvr>
-                                        <p:cTn id="14" dur="1" fill="hold">
-                                          <p:stCondLst>
-                                            <p:cond delay="0"/>
-                                          </p:stCondLst>
-                                        </p:cTn>
-                                        <p:tgtEl>
-                                          <p:spTgt spid="7"/>
                                         </p:tgtEl>
                                         <p:attrNameLst>
                                           <p:attrName>style.visibility</p:attrName>
@@ -17168,8 +17075,8 @@
         </p:nvSpPr>
         <p:spPr>
           <a:xfrm>
-            <a:off x="357352" y="3065790"/>
-            <a:ext cx="11740055" cy="1255621"/>
+            <a:off x="375762" y="2534545"/>
+            <a:ext cx="11740055" cy="2687968"/>
           </a:xfrm>
           <a:prstGeom prst="rect">
             <a:avLst/>
@@ -17177,7 +17084,7 @@
         </p:spPr>
         <p:txBody>
           <a:bodyPr>
-            <a:normAutofit fontScale="77500" lnSpcReduction="20000"/>
+            <a:normAutofit fontScale="85000" lnSpcReduction="10000"/>
           </a:bodyPr>
           <a:lstStyle>
             <a:lvl1pPr marL="228600" indent="-228600" algn="l" defTabSz="914400" rtl="0" eaLnBrk="1" latinLnBrk="0" hangingPunct="1">
@@ -17409,8 +17316,14 @@
             </a:br>
             <a:r>
               <a:rPr lang="de-DE" sz="6600" dirty="0"/>
-              <a:t>= </a:t>
-            </a:r>
+              <a:t>=</a:t>
+            </a:r>
+          </a:p>
+          <a:p>
+            <a:pPr marL="0" indent="0" algn="ctr">
+              <a:buFont typeface="Arial" panose="020B0604020202020204" pitchFamily="34" charset="0"/>
+              <a:buNone/>
+            </a:pPr>
             <a:r>
               <a:rPr lang="de-DE" sz="6600" dirty="0" err="1"/>
               <a:t>secure</a:t>

</xml_diff>